<commit_message>
up to 10 slides for Handling Events presentation
</commit_message>
<xml_diff>
--- a/Handling Events in React.pptx
+++ b/Handling Events in React.pptx
@@ -5,16 +5,20 @@
     <p:sldMasterId id="2147483684" r:id="rId1"/>
   </p:sldMasterIdLst>
   <p:notesMasterIdLst>
-    <p:notesMasterId r:id="rId9"/>
+    <p:notesMasterId r:id="rId13"/>
   </p:notesMasterIdLst>
   <p:sldIdLst>
     <p:sldId id="256" r:id="rId2"/>
     <p:sldId id="257" r:id="rId3"/>
-    <p:sldId id="258" r:id="rId4"/>
-    <p:sldId id="261" r:id="rId5"/>
-    <p:sldId id="262" r:id="rId6"/>
-    <p:sldId id="259" r:id="rId7"/>
-    <p:sldId id="260" r:id="rId8"/>
+    <p:sldId id="269" r:id="rId4"/>
+    <p:sldId id="268" r:id="rId5"/>
+    <p:sldId id="266" r:id="rId6"/>
+    <p:sldId id="258" r:id="rId7"/>
+    <p:sldId id="262" r:id="rId8"/>
+    <p:sldId id="265" r:id="rId9"/>
+    <p:sldId id="259" r:id="rId10"/>
+    <p:sldId id="260" r:id="rId11"/>
+    <p:sldId id="263" r:id="rId12"/>
   </p:sldIdLst>
   <p:sldSz cx="9144000" cy="6858000" type="screen4x3"/>
   <p:notesSz cx="6858000" cy="9144000"/>
@@ -198,7 +202,7 @@
           <a:p>
             <a:fld id="{4F1ACDC5-A11F-47E5-B3C0-38E221B6E6BC}" type="datetimeFigureOut">
               <a:rPr lang="en-CA" smtClean="0"/>
-              <a:t>2019-12-09</a:t>
+              <a:t>2019-12-12</a:t>
             </a:fld>
             <a:endParaRPr lang="en-CA"/>
           </a:p>
@@ -539,7 +543,99 @@
           <a:p>
             <a:fld id="{C3A34F3E-182E-40E5-995A-487B87953276}" type="slidenum">
               <a:rPr lang="en-CA" smtClean="0"/>
-              <a:t>3</a:t>
+              <a:t>6</a:t>
+            </a:fld>
+            <a:endParaRPr lang="en-CA"/>
+          </a:p>
+        </p:txBody>
+      </p:sp>
+    </p:spTree>
+    <p:extLst>
+      <p:ext uri="{BB962C8B-B14F-4D97-AF65-F5344CB8AC3E}">
+        <p14:creationId xmlns:p14="http://schemas.microsoft.com/office/powerpoint/2010/main" val="3565943390"/>
+      </p:ext>
+    </p:extLst>
+  </p:cSld>
+  <p:clrMapOvr>
+    <a:masterClrMapping/>
+  </p:clrMapOvr>
+</p:notes>
+</file>
+
+<file path=ppt/notesSlides/notesSlide2.xml><?xml version="1.0" encoding="utf-8"?>
+<p:notes xmlns:a="http://schemas.openxmlformats.org/drawingml/2006/main" xmlns:r="http://schemas.openxmlformats.org/officeDocument/2006/relationships" xmlns:p="http://schemas.openxmlformats.org/presentationml/2006/main">
+  <p:cSld>
+    <p:spTree>
+      <p:nvGrpSpPr>
+        <p:cNvPr id="1" name=""/>
+        <p:cNvGrpSpPr/>
+        <p:nvPr/>
+      </p:nvGrpSpPr>
+      <p:grpSpPr>
+        <a:xfrm>
+          <a:off x="0" y="0"/>
+          <a:ext cx="0" cy="0"/>
+          <a:chOff x="0" y="0"/>
+          <a:chExt cx="0" cy="0"/>
+        </a:xfrm>
+      </p:grpSpPr>
+      <p:sp>
+        <p:nvSpPr>
+          <p:cNvPr id="2" name="Slide Image Placeholder 1"/>
+          <p:cNvSpPr>
+            <a:spLocks noGrp="1" noRot="1" noChangeAspect="1"/>
+          </p:cNvSpPr>
+          <p:nvPr>
+            <p:ph type="sldImg"/>
+          </p:nvPr>
+        </p:nvSpPr>
+        <p:spPr/>
+      </p:sp>
+      <p:sp>
+        <p:nvSpPr>
+          <p:cNvPr id="3" name="Notes Placeholder 2"/>
+          <p:cNvSpPr>
+            <a:spLocks noGrp="1"/>
+          </p:cNvSpPr>
+          <p:nvPr>
+            <p:ph type="body" idx="1"/>
+          </p:nvPr>
+        </p:nvSpPr>
+        <p:spPr/>
+        <p:txBody>
+          <a:bodyPr/>
+          <a:lstStyle/>
+          <a:p>
+            <a:r>
+              <a:rPr lang="en-US" dirty="0" smtClean="0"/>
+              <a:t>If something</a:t>
+            </a:r>
+            <a:r>
+              <a:rPr lang="en-US" baseline="0" dirty="0" smtClean="0"/>
+              <a:t> is “implicit”, it means that the JS engine does it, if it’s “explicit”, it means the user must do it. </a:t>
+            </a:r>
+            <a:endParaRPr lang="en-CA" dirty="0"/>
+          </a:p>
+        </p:txBody>
+      </p:sp>
+      <p:sp>
+        <p:nvSpPr>
+          <p:cNvPr id="4" name="Slide Number Placeholder 3"/>
+          <p:cNvSpPr>
+            <a:spLocks noGrp="1"/>
+          </p:cNvSpPr>
+          <p:nvPr>
+            <p:ph type="sldNum" sz="quarter" idx="10"/>
+          </p:nvPr>
+        </p:nvSpPr>
+        <p:spPr/>
+        <p:txBody>
+          <a:bodyPr/>
+          <a:lstStyle/>
+          <a:p>
+            <a:fld id="{C3A34F3E-182E-40E5-995A-487B87953276}" type="slidenum">
+              <a:rPr lang="en-CA" smtClean="0"/>
+              <a:t>7</a:t>
             </a:fld>
             <a:endParaRPr lang="en-CA"/>
           </a:p>
@@ -669,7 +765,7 @@
           <a:p>
             <a:fld id="{7B4123E2-09D3-4733-8A3F-3F7772162D85}" type="datetimeFigureOut">
               <a:rPr lang="en-CA" smtClean="0"/>
-              <a:t>2019-12-09</a:t>
+              <a:t>2019-12-12</a:t>
             </a:fld>
             <a:endParaRPr lang="en-CA"/>
           </a:p>
@@ -895,7 +991,7 @@
           <a:p>
             <a:fld id="{7B4123E2-09D3-4733-8A3F-3F7772162D85}" type="datetimeFigureOut">
               <a:rPr lang="en-CA" smtClean="0"/>
-              <a:t>2019-12-09</a:t>
+              <a:t>2019-12-12</a:t>
             </a:fld>
             <a:endParaRPr lang="en-CA"/>
           </a:p>
@@ -1070,7 +1166,7 @@
           <a:p>
             <a:fld id="{7B4123E2-09D3-4733-8A3F-3F7772162D85}" type="datetimeFigureOut">
               <a:rPr lang="en-CA" smtClean="0"/>
-              <a:t>2019-12-09</a:t>
+              <a:t>2019-12-12</a:t>
             </a:fld>
             <a:endParaRPr lang="en-CA"/>
           </a:p>
@@ -1235,7 +1331,7 @@
           <a:p>
             <a:fld id="{7B4123E2-09D3-4733-8A3F-3F7772162D85}" type="datetimeFigureOut">
               <a:rPr lang="en-CA" smtClean="0"/>
-              <a:t>2019-12-09</a:t>
+              <a:t>2019-12-12</a:t>
             </a:fld>
             <a:endParaRPr lang="en-CA"/>
           </a:p>
@@ -1479,7 +1575,7 @@
           <a:p>
             <a:fld id="{7B4123E2-09D3-4733-8A3F-3F7772162D85}" type="datetimeFigureOut">
               <a:rPr lang="en-CA" smtClean="0"/>
-              <a:t>2019-12-09</a:t>
+              <a:t>2019-12-12</a:t>
             </a:fld>
             <a:endParaRPr lang="en-CA"/>
           </a:p>
@@ -1743,7 +1839,7 @@
           <a:p>
             <a:fld id="{7B4123E2-09D3-4733-8A3F-3F7772162D85}" type="datetimeFigureOut">
               <a:rPr lang="en-CA" smtClean="0"/>
-              <a:t>2019-12-09</a:t>
+              <a:t>2019-12-12</a:t>
             </a:fld>
             <a:endParaRPr lang="en-CA"/>
           </a:p>
@@ -2117,7 +2213,7 @@
           <a:p>
             <a:fld id="{7B4123E2-09D3-4733-8A3F-3F7772162D85}" type="datetimeFigureOut">
               <a:rPr lang="en-CA" smtClean="0"/>
-              <a:t>2019-12-09</a:t>
+              <a:t>2019-12-12</a:t>
             </a:fld>
             <a:endParaRPr lang="en-CA"/>
           </a:p>
@@ -2230,7 +2326,7 @@
           <a:p>
             <a:fld id="{7B4123E2-09D3-4733-8A3F-3F7772162D85}" type="datetimeFigureOut">
               <a:rPr lang="en-CA" smtClean="0"/>
-              <a:t>2019-12-09</a:t>
+              <a:t>2019-12-12</a:t>
             </a:fld>
             <a:endParaRPr lang="en-CA"/>
           </a:p>
@@ -2320,7 +2416,7 @@
           <a:p>
             <a:fld id="{7B4123E2-09D3-4733-8A3F-3F7772162D85}" type="datetimeFigureOut">
               <a:rPr lang="en-CA" smtClean="0"/>
-              <a:t>2019-12-09</a:t>
+              <a:t>2019-12-12</a:t>
             </a:fld>
             <a:endParaRPr lang="en-CA"/>
           </a:p>
@@ -2578,7 +2674,7 @@
           <a:p>
             <a:fld id="{7B4123E2-09D3-4733-8A3F-3F7772162D85}" type="datetimeFigureOut">
               <a:rPr lang="en-CA" smtClean="0"/>
-              <a:t>2019-12-09</a:t>
+              <a:t>2019-12-12</a:t>
             </a:fld>
             <a:endParaRPr lang="en-CA"/>
           </a:p>
@@ -2842,7 +2938,7 @@
           <a:p>
             <a:fld id="{7B4123E2-09D3-4733-8A3F-3F7772162D85}" type="datetimeFigureOut">
               <a:rPr lang="en-CA" smtClean="0"/>
-              <a:t>2019-12-09</a:t>
+              <a:t>2019-12-12</a:t>
             </a:fld>
             <a:endParaRPr lang="en-CA"/>
           </a:p>
@@ -3059,7 +3155,7 @@
           <a:p>
             <a:fld id="{7B4123E2-09D3-4733-8A3F-3F7772162D85}" type="datetimeFigureOut">
               <a:rPr lang="en-CA" smtClean="0"/>
-              <a:t>2019-12-09</a:t>
+              <a:t>2019-12-12</a:t>
             </a:fld>
             <a:endParaRPr lang="en-CA"/>
           </a:p>
@@ -3564,6 +3660,148 @@
 </p:sld>
 </file>
 
+<file path=ppt/slides/slide10.xml><?xml version="1.0" encoding="utf-8"?>
+<p:sld xmlns:a="http://schemas.openxmlformats.org/drawingml/2006/main" xmlns:r="http://schemas.openxmlformats.org/officeDocument/2006/relationships" xmlns:p="http://schemas.openxmlformats.org/presentationml/2006/main">
+  <p:cSld>
+    <p:spTree>
+      <p:nvGrpSpPr>
+        <p:cNvPr id="1" name=""/>
+        <p:cNvGrpSpPr/>
+        <p:nvPr/>
+      </p:nvGrpSpPr>
+      <p:grpSpPr>
+        <a:xfrm>
+          <a:off x="0" y="0"/>
+          <a:ext cx="0" cy="0"/>
+          <a:chOff x="0" y="0"/>
+          <a:chExt cx="0" cy="0"/>
+        </a:xfrm>
+      </p:grpSpPr>
+      <p:sp>
+        <p:nvSpPr>
+          <p:cNvPr id="2" name="Title 1"/>
+          <p:cNvSpPr>
+            <a:spLocks noGrp="1"/>
+          </p:cNvSpPr>
+          <p:nvPr>
+            <p:ph type="title"/>
+          </p:nvPr>
+        </p:nvSpPr>
+        <p:spPr/>
+        <p:txBody>
+          <a:bodyPr>
+            <a:normAutofit fontScale="90000"/>
+          </a:bodyPr>
+          <a:lstStyle/>
+          <a:p>
+            <a:r>
+              <a:rPr lang="en-CA" dirty="0" smtClean="0"/>
+              <a:t>Passing Arguments to Event Handlers</a:t>
+            </a:r>
+            <a:endParaRPr lang="en-CA" dirty="0"/>
+          </a:p>
+        </p:txBody>
+      </p:sp>
+      <p:sp>
+        <p:nvSpPr>
+          <p:cNvPr id="3" name="Content Placeholder 2"/>
+          <p:cNvSpPr>
+            <a:spLocks noGrp="1"/>
+          </p:cNvSpPr>
+          <p:nvPr>
+            <p:ph idx="1"/>
+          </p:nvPr>
+        </p:nvSpPr>
+        <p:spPr/>
+        <p:txBody>
+          <a:bodyPr/>
+          <a:lstStyle/>
+          <a:p>
+            <a:endParaRPr lang="en-CA" dirty="0"/>
+          </a:p>
+        </p:txBody>
+      </p:sp>
+    </p:spTree>
+    <p:extLst>
+      <p:ext uri="{BB962C8B-B14F-4D97-AF65-F5344CB8AC3E}">
+        <p14:creationId xmlns:p14="http://schemas.microsoft.com/office/powerpoint/2010/main" val="194129807"/>
+      </p:ext>
+    </p:extLst>
+  </p:cSld>
+  <p:clrMapOvr>
+    <a:masterClrMapping/>
+  </p:clrMapOvr>
+</p:sld>
+</file>
+
+<file path=ppt/slides/slide11.xml><?xml version="1.0" encoding="utf-8"?>
+<p:sld xmlns:a="http://schemas.openxmlformats.org/drawingml/2006/main" xmlns:r="http://schemas.openxmlformats.org/officeDocument/2006/relationships" xmlns:p="http://schemas.openxmlformats.org/presentationml/2006/main">
+  <p:cSld>
+    <p:spTree>
+      <p:nvGrpSpPr>
+        <p:cNvPr id="1" name=""/>
+        <p:cNvGrpSpPr/>
+        <p:nvPr/>
+      </p:nvGrpSpPr>
+      <p:grpSpPr>
+        <a:xfrm>
+          <a:off x="0" y="0"/>
+          <a:ext cx="0" cy="0"/>
+          <a:chOff x="0" y="0"/>
+          <a:chExt cx="0" cy="0"/>
+        </a:xfrm>
+      </p:grpSpPr>
+      <p:sp>
+        <p:nvSpPr>
+          <p:cNvPr id="2" name="Title 1"/>
+          <p:cNvSpPr>
+            <a:spLocks noGrp="1"/>
+          </p:cNvSpPr>
+          <p:nvPr>
+            <p:ph type="title"/>
+          </p:nvPr>
+        </p:nvSpPr>
+        <p:spPr/>
+        <p:txBody>
+          <a:bodyPr/>
+          <a:lstStyle/>
+          <a:p>
+            <a:endParaRPr lang="en-CA"/>
+          </a:p>
+        </p:txBody>
+      </p:sp>
+      <p:sp>
+        <p:nvSpPr>
+          <p:cNvPr id="3" name="Content Placeholder 2"/>
+          <p:cNvSpPr>
+            <a:spLocks noGrp="1"/>
+          </p:cNvSpPr>
+          <p:nvPr>
+            <p:ph idx="1"/>
+          </p:nvPr>
+        </p:nvSpPr>
+        <p:spPr/>
+        <p:txBody>
+          <a:bodyPr/>
+          <a:lstStyle/>
+          <a:p>
+            <a:endParaRPr lang="en-CA"/>
+          </a:p>
+        </p:txBody>
+      </p:sp>
+    </p:spTree>
+    <p:extLst>
+      <p:ext uri="{BB962C8B-B14F-4D97-AF65-F5344CB8AC3E}">
+        <p14:creationId xmlns:p14="http://schemas.microsoft.com/office/powerpoint/2010/main" val="2385749612"/>
+      </p:ext>
+    </p:extLst>
+  </p:cSld>
+  <p:clrMapOvr>
+    <a:masterClrMapping/>
+  </p:clrMapOvr>
+</p:sld>
+</file>
+
 <file path=ppt/slides/slide2.xml><?xml version="1.0" encoding="utf-8"?>
 <p:sld xmlns:a="http://schemas.openxmlformats.org/drawingml/2006/main" xmlns:r="http://schemas.openxmlformats.org/officeDocument/2006/relationships" xmlns:p="http://schemas.openxmlformats.org/presentationml/2006/main">
   <p:cSld>
@@ -3600,11 +3838,7 @@
           <a:p>
             <a:r>
               <a:rPr lang="en-CA" dirty="0" smtClean="0"/>
-              <a:t>Syntactic </a:t>
-            </a:r>
-            <a:r>
-              <a:rPr lang="en-CA" dirty="0" smtClean="0"/>
-              <a:t>Differences Compared with Handling DOM Elements</a:t>
+              <a:t>Syntactic Differences Compared with Handling DOM Elements</a:t>
             </a:r>
             <a:endParaRPr lang="en-CA" dirty="0"/>
           </a:p>
@@ -3709,34 +3943,6 @@
           </a:bodyPr>
           <a:lstStyle/>
           <a:p>
-            <a:r>
-              <a:rPr lang="en-US" dirty="0" smtClean="0">
-                <a:effectLst>
-                  <a:outerShdw blurRad="38100" dist="38100" dir="2700000" algn="tl">
-                    <a:srgbClr val="000000">
-                      <a:alpha val="43137"/>
-                    </a:srgbClr>
-                  </a:outerShdw>
-                </a:effectLst>
-              </a:rPr>
-              <a:t>Events are lowercase</a:t>
-            </a:r>
-          </a:p>
-          <a:p>
-            <a:r>
-              <a:rPr lang="en-US" dirty="0" smtClean="0">
-                <a:effectLst>
-                  <a:outerShdw blurRad="38100" dist="38100" dir="2700000" algn="tl">
-                    <a:srgbClr val="000000">
-                      <a:alpha val="43137"/>
-                    </a:srgbClr>
-                  </a:outerShdw>
-                </a:effectLst>
-              </a:rPr>
-              <a:t>Event handlers are passed as strings.</a:t>
-            </a:r>
-          </a:p>
-          <a:p>
             <a:endParaRPr lang="en-US" dirty="0">
               <a:effectLst>
                 <a:outerShdw blurRad="38100" dist="38100" dir="2700000" algn="tl">
@@ -3747,109 +3953,6 @@
               </a:effectLst>
             </a:endParaRPr>
           </a:p>
-          <a:p>
-            <a:pPr marL="0" indent="0">
-              <a:buNone/>
-            </a:pPr>
-            <a:r>
-              <a:rPr lang="en-US" dirty="0" smtClean="0">
-                <a:effectLst>
-                  <a:outerShdw blurRad="38100" dist="38100" dir="2700000" algn="tl">
-                    <a:srgbClr val="000000">
-                      <a:alpha val="43137"/>
-                    </a:srgbClr>
-                  </a:outerShdw>
-                </a:effectLst>
-              </a:rPr>
-              <a:t>Example:</a:t>
-            </a:r>
-          </a:p>
-          <a:p>
-            <a:pPr marL="0" indent="0">
-              <a:buNone/>
-            </a:pPr>
-            <a:r>
-              <a:rPr lang="en-US" dirty="0">
-                <a:effectLst>
-                  <a:outerShdw blurRad="38100" dist="38100" dir="2700000" algn="tl">
-                    <a:srgbClr val="000000">
-                      <a:alpha val="43137"/>
-                    </a:srgbClr>
-                  </a:outerShdw>
-                </a:effectLst>
-              </a:rPr>
-              <a:t>&lt;button </a:t>
-            </a:r>
-            <a:r>
-              <a:rPr lang="en-US" dirty="0" err="1">
-                <a:effectLst>
-                  <a:outerShdw blurRad="38100" dist="38100" dir="2700000" algn="tl">
-                    <a:srgbClr val="000000">
-                      <a:alpha val="43137"/>
-                    </a:srgbClr>
-                  </a:outerShdw>
-                </a:effectLst>
-              </a:rPr>
-              <a:t>onclick</a:t>
-            </a:r>
-            <a:r>
-              <a:rPr lang="en-US" dirty="0" smtClean="0">
-                <a:effectLst>
-                  <a:outerShdw blurRad="38100" dist="38100" dir="2700000" algn="tl">
-                    <a:srgbClr val="000000">
-                      <a:alpha val="43137"/>
-                    </a:srgbClr>
-                  </a:outerShdw>
-                </a:effectLst>
-              </a:rPr>
-              <a:t>=“</a:t>
-            </a:r>
-            <a:r>
-              <a:rPr lang="en-US" dirty="0" err="1" smtClean="0">
-                <a:effectLst>
-                  <a:outerShdw blurRad="38100" dist="38100" dir="2700000" algn="tl">
-                    <a:srgbClr val="000000">
-                      <a:alpha val="43137"/>
-                    </a:srgbClr>
-                  </a:outerShdw>
-                </a:effectLst>
-              </a:rPr>
-              <a:t>helloWorld</a:t>
-            </a:r>
-            <a:r>
-              <a:rPr lang="en-US" dirty="0" smtClean="0">
-                <a:effectLst>
-                  <a:outerShdw blurRad="38100" dist="38100" dir="2700000" algn="tl">
-                    <a:srgbClr val="000000">
-                      <a:alpha val="43137"/>
-                    </a:srgbClr>
-                  </a:outerShdw>
-                </a:effectLst>
-              </a:rPr>
-              <a:t>()"&gt; Hello World!&lt;/</a:t>
-            </a:r>
-            <a:r>
-              <a:rPr lang="en-US" dirty="0">
-                <a:effectLst>
-                  <a:outerShdw blurRad="38100" dist="38100" dir="2700000" algn="tl">
-                    <a:srgbClr val="000000">
-                      <a:alpha val="43137"/>
-                    </a:srgbClr>
-                  </a:outerShdw>
-                </a:effectLst>
-              </a:rPr>
-              <a:t>button&gt;</a:t>
-            </a:r>
-            <a:endParaRPr lang="en-CA" dirty="0">
-              <a:effectLst>
-                <a:outerShdw blurRad="38100" dist="38100" dir="2700000" algn="tl">
-                  <a:srgbClr val="000000">
-                    <a:alpha val="43137"/>
-                  </a:srgbClr>
-                </a:outerShdw>
-              </a:effectLst>
-            </a:endParaRPr>
-          </a:p>
         </p:txBody>
       </p:sp>
       <p:sp>
@@ -3869,159 +3972,7 @@
           </a:bodyPr>
           <a:lstStyle/>
           <a:p>
-            <a:r>
-              <a:rPr lang="en-US" dirty="0" smtClean="0">
-                <a:effectLst>
-                  <a:outerShdw blurRad="38100" dist="38100" dir="2700000" algn="tl">
-                    <a:srgbClr val="000000">
-                      <a:alpha val="43137"/>
-                    </a:srgbClr>
-                  </a:outerShdw>
-                </a:effectLst>
-              </a:rPr>
-              <a:t>Events are </a:t>
-            </a:r>
-            <a:r>
-              <a:rPr lang="en-US" dirty="0" err="1" smtClean="0">
-                <a:effectLst>
-                  <a:outerShdw blurRad="38100" dist="38100" dir="2700000" algn="tl">
-                    <a:srgbClr val="000000">
-                      <a:alpha val="43137"/>
-                    </a:srgbClr>
-                  </a:outerShdw>
-                </a:effectLst>
-              </a:rPr>
-              <a:t>camelCase</a:t>
-            </a:r>
-            <a:endParaRPr lang="en-US" dirty="0" smtClean="0">
-              <a:effectLst>
-                <a:outerShdw blurRad="38100" dist="38100" dir="2700000" algn="tl">
-                  <a:srgbClr val="000000">
-                    <a:alpha val="43137"/>
-                  </a:srgbClr>
-                </a:outerShdw>
-              </a:effectLst>
-            </a:endParaRPr>
-          </a:p>
-          <a:p>
-            <a:r>
-              <a:rPr lang="en-US" dirty="0" smtClean="0">
-                <a:effectLst>
-                  <a:outerShdw blurRad="38100" dist="38100" dir="2700000" algn="tl">
-                    <a:srgbClr val="000000">
-                      <a:alpha val="43137"/>
-                    </a:srgbClr>
-                  </a:outerShdw>
-                </a:effectLst>
-              </a:rPr>
-              <a:t>Event handlers are passed as functions.</a:t>
-            </a:r>
-          </a:p>
-          <a:p>
             <a:endParaRPr lang="en-US" dirty="0">
-              <a:effectLst>
-                <a:outerShdw blurRad="38100" dist="38100" dir="2700000" algn="tl">
-                  <a:srgbClr val="000000">
-                    <a:alpha val="43137"/>
-                  </a:srgbClr>
-                </a:outerShdw>
-              </a:effectLst>
-            </a:endParaRPr>
-          </a:p>
-          <a:p>
-            <a:pPr marL="0" indent="0">
-              <a:buNone/>
-            </a:pPr>
-            <a:r>
-              <a:rPr lang="en-US" dirty="0" smtClean="0">
-                <a:effectLst>
-                  <a:outerShdw blurRad="38100" dist="38100" dir="2700000" algn="tl">
-                    <a:srgbClr val="000000">
-                      <a:alpha val="43137"/>
-                    </a:srgbClr>
-                  </a:outerShdw>
-                </a:effectLst>
-              </a:rPr>
-              <a:t>Example:</a:t>
-            </a:r>
-          </a:p>
-          <a:p>
-            <a:pPr marL="0" indent="0">
-              <a:buNone/>
-            </a:pPr>
-            <a:r>
-              <a:rPr lang="en-US" dirty="0">
-                <a:effectLst>
-                  <a:outerShdw blurRad="38100" dist="38100" dir="2700000" algn="tl">
-                    <a:srgbClr val="000000">
-                      <a:alpha val="43137"/>
-                    </a:srgbClr>
-                  </a:outerShdw>
-                </a:effectLst>
-              </a:rPr>
-              <a:t>&lt;button </a:t>
-            </a:r>
-            <a:r>
-              <a:rPr lang="en-US" dirty="0" err="1">
-                <a:effectLst>
-                  <a:outerShdw blurRad="38100" dist="38100" dir="2700000" algn="tl">
-                    <a:srgbClr val="000000">
-                      <a:alpha val="43137"/>
-                    </a:srgbClr>
-                  </a:outerShdw>
-                </a:effectLst>
-              </a:rPr>
-              <a:t>onClick</a:t>
-            </a:r>
-            <a:r>
-              <a:rPr lang="en-US" dirty="0" smtClean="0">
-                <a:effectLst>
-                  <a:outerShdw blurRad="38100" dist="38100" dir="2700000" algn="tl">
-                    <a:srgbClr val="000000">
-                      <a:alpha val="43137"/>
-                    </a:srgbClr>
-                  </a:outerShdw>
-                </a:effectLst>
-              </a:rPr>
-              <a:t>={</a:t>
-            </a:r>
-            <a:r>
-              <a:rPr lang="en-US" dirty="0" err="1" smtClean="0">
-                <a:effectLst>
-                  <a:outerShdw blurRad="38100" dist="38100" dir="2700000" algn="tl">
-                    <a:srgbClr val="000000">
-                      <a:alpha val="43137"/>
-                    </a:srgbClr>
-                  </a:outerShdw>
-                </a:effectLst>
-              </a:rPr>
-              <a:t>helloWorld</a:t>
-            </a:r>
-            <a:r>
-              <a:rPr lang="en-US" dirty="0" smtClean="0">
-                <a:effectLst>
-                  <a:outerShdw blurRad="38100" dist="38100" dir="2700000" algn="tl">
-                    <a:srgbClr val="000000">
-                      <a:alpha val="43137"/>
-                    </a:srgbClr>
-                  </a:outerShdw>
-                </a:effectLst>
-              </a:rPr>
-              <a:t>}&gt; Hello World! </a:t>
-            </a:r>
-            <a:r>
-              <a:rPr lang="en-US" dirty="0">
-                <a:effectLst>
-                  <a:outerShdw blurRad="38100" dist="38100" dir="2700000" algn="tl">
-                    <a:srgbClr val="000000">
-                      <a:alpha val="43137"/>
-                    </a:srgbClr>
-                  </a:outerShdw>
-                </a:effectLst>
-              </a:rPr>
-              <a:t>&lt;/button&gt;</a:t>
-            </a:r>
-            <a:endParaRPr lang="en-CA" dirty="0">
               <a:effectLst>
                 <a:outerShdw blurRad="38100" dist="38100" dir="2700000" algn="tl">
                   <a:srgbClr val="000000">
@@ -4047,6 +3998,986 @@
 </file>
 
 <file path=ppt/slides/slide3.xml><?xml version="1.0" encoding="utf-8"?>
+<p:sld xmlns:a="http://schemas.openxmlformats.org/drawingml/2006/main" xmlns:r="http://schemas.openxmlformats.org/officeDocument/2006/relationships" xmlns:p="http://schemas.openxmlformats.org/presentationml/2006/main">
+  <p:cSld>
+    <p:spTree>
+      <p:nvGrpSpPr>
+        <p:cNvPr id="1" name=""/>
+        <p:cNvGrpSpPr/>
+        <p:nvPr/>
+      </p:nvGrpSpPr>
+      <p:grpSpPr>
+        <a:xfrm>
+          <a:off x="0" y="0"/>
+          <a:ext cx="0" cy="0"/>
+          <a:chOff x="0" y="0"/>
+          <a:chExt cx="0" cy="0"/>
+        </a:xfrm>
+      </p:grpSpPr>
+      <p:sp>
+        <p:nvSpPr>
+          <p:cNvPr id="2" name="Title 1"/>
+          <p:cNvSpPr>
+            <a:spLocks noGrp="1"/>
+          </p:cNvSpPr>
+          <p:nvPr>
+            <p:ph type="title"/>
+          </p:nvPr>
+        </p:nvSpPr>
+        <p:spPr/>
+        <p:txBody>
+          <a:bodyPr>
+            <a:normAutofit fontScale="90000"/>
+          </a:bodyPr>
+          <a:lstStyle/>
+          <a:p>
+            <a:r>
+              <a:rPr lang="en-CA" dirty="0" smtClean="0"/>
+              <a:t>Syntactic Differences Compared with Handling DOM Elements</a:t>
+            </a:r>
+            <a:endParaRPr lang="en-CA" dirty="0"/>
+          </a:p>
+        </p:txBody>
+      </p:sp>
+      <p:sp>
+        <p:nvSpPr>
+          <p:cNvPr id="4" name="Text Placeholder 3"/>
+          <p:cNvSpPr>
+            <a:spLocks noGrp="1"/>
+          </p:cNvSpPr>
+          <p:nvPr>
+            <p:ph type="body" idx="1"/>
+          </p:nvPr>
+        </p:nvSpPr>
+        <p:spPr/>
+        <p:txBody>
+          <a:bodyPr>
+            <a:normAutofit/>
+          </a:bodyPr>
+          <a:lstStyle/>
+          <a:p>
+            <a:r>
+              <a:rPr lang="en-US" dirty="0" smtClean="0">
+                <a:effectLst>
+                  <a:outerShdw blurRad="38100" dist="38100" dir="2700000" algn="tl">
+                    <a:srgbClr val="000000">
+                      <a:alpha val="43137"/>
+                    </a:srgbClr>
+                  </a:outerShdw>
+                </a:effectLst>
+              </a:rPr>
+              <a:t>DOM</a:t>
+            </a:r>
+            <a:endParaRPr lang="en-CA" dirty="0">
+              <a:effectLst>
+                <a:outerShdw blurRad="38100" dist="38100" dir="2700000" algn="tl">
+                  <a:srgbClr val="000000">
+                    <a:alpha val="43137"/>
+                  </a:srgbClr>
+                </a:outerShdw>
+              </a:effectLst>
+            </a:endParaRPr>
+          </a:p>
+        </p:txBody>
+      </p:sp>
+      <p:sp>
+        <p:nvSpPr>
+          <p:cNvPr id="6" name="Text Placeholder 5"/>
+          <p:cNvSpPr>
+            <a:spLocks noGrp="1"/>
+          </p:cNvSpPr>
+          <p:nvPr>
+            <p:ph type="body" sz="half" idx="3"/>
+          </p:nvPr>
+        </p:nvSpPr>
+        <p:spPr/>
+        <p:txBody>
+          <a:bodyPr>
+            <a:normAutofit/>
+          </a:bodyPr>
+          <a:lstStyle/>
+          <a:p>
+            <a:r>
+              <a:rPr lang="en-US" dirty="0" smtClean="0">
+                <a:effectLst>
+                  <a:outerShdw blurRad="38100" dist="38100" dir="2700000" algn="tl">
+                    <a:srgbClr val="000000">
+                      <a:alpha val="43137"/>
+                    </a:srgbClr>
+                  </a:outerShdw>
+                </a:effectLst>
+              </a:rPr>
+              <a:t>React</a:t>
+            </a:r>
+            <a:endParaRPr lang="en-CA" dirty="0">
+              <a:effectLst>
+                <a:outerShdw blurRad="38100" dist="38100" dir="2700000" algn="tl">
+                  <a:srgbClr val="000000">
+                    <a:alpha val="43137"/>
+                  </a:srgbClr>
+                </a:outerShdw>
+              </a:effectLst>
+            </a:endParaRPr>
+          </a:p>
+        </p:txBody>
+      </p:sp>
+      <p:sp>
+        <p:nvSpPr>
+          <p:cNvPr id="5" name="Content Placeholder 4"/>
+          <p:cNvSpPr>
+            <a:spLocks noGrp="1"/>
+          </p:cNvSpPr>
+          <p:nvPr>
+            <p:ph sz="quarter" idx="2"/>
+          </p:nvPr>
+        </p:nvSpPr>
+        <p:spPr/>
+        <p:txBody>
+          <a:bodyPr>
+            <a:normAutofit/>
+          </a:bodyPr>
+          <a:lstStyle/>
+          <a:p>
+            <a:r>
+              <a:rPr lang="en-US" dirty="0" smtClean="0">
+                <a:effectLst>
+                  <a:outerShdw blurRad="38100" dist="38100" dir="2700000" algn="tl">
+                    <a:srgbClr val="000000">
+                      <a:alpha val="43137"/>
+                    </a:srgbClr>
+                  </a:outerShdw>
+                </a:effectLst>
+              </a:rPr>
+              <a:t>Events are lowercase</a:t>
+            </a:r>
+          </a:p>
+          <a:p>
+            <a:r>
+              <a:rPr lang="en-US" dirty="0" smtClean="0">
+                <a:effectLst>
+                  <a:outerShdw blurRad="38100" dist="38100" dir="2700000" algn="tl">
+                    <a:srgbClr val="000000">
+                      <a:alpha val="43137"/>
+                    </a:srgbClr>
+                  </a:outerShdw>
+                </a:effectLst>
+              </a:rPr>
+              <a:t>Event handlers are passed as strings.</a:t>
+            </a:r>
+          </a:p>
+          <a:p>
+            <a:endParaRPr lang="en-US" dirty="0">
+              <a:effectLst>
+                <a:outerShdw blurRad="38100" dist="38100" dir="2700000" algn="tl">
+                  <a:srgbClr val="000000">
+                    <a:alpha val="43137"/>
+                  </a:srgbClr>
+                </a:outerShdw>
+              </a:effectLst>
+            </a:endParaRPr>
+          </a:p>
+        </p:txBody>
+      </p:sp>
+      <p:sp>
+        <p:nvSpPr>
+          <p:cNvPr id="7" name="Content Placeholder 6"/>
+          <p:cNvSpPr>
+            <a:spLocks noGrp="1"/>
+          </p:cNvSpPr>
+          <p:nvPr>
+            <p:ph sz="quarter" idx="4"/>
+          </p:nvPr>
+        </p:nvSpPr>
+        <p:spPr/>
+        <p:txBody>
+          <a:bodyPr>
+            <a:normAutofit/>
+          </a:bodyPr>
+          <a:lstStyle/>
+          <a:p>
+            <a:endParaRPr lang="en-US" dirty="0">
+              <a:effectLst>
+                <a:outerShdw blurRad="38100" dist="38100" dir="2700000" algn="tl">
+                  <a:srgbClr val="000000">
+                    <a:alpha val="43137"/>
+                  </a:srgbClr>
+                </a:outerShdw>
+              </a:effectLst>
+            </a:endParaRPr>
+          </a:p>
+        </p:txBody>
+      </p:sp>
+    </p:spTree>
+    <p:extLst>
+      <p:ext uri="{BB962C8B-B14F-4D97-AF65-F5344CB8AC3E}">
+        <p14:creationId xmlns:p14="http://schemas.microsoft.com/office/powerpoint/2010/main" val="50877983"/>
+      </p:ext>
+    </p:extLst>
+  </p:cSld>
+  <p:clrMapOvr>
+    <a:masterClrMapping/>
+  </p:clrMapOvr>
+</p:sld>
+</file>
+
+<file path=ppt/slides/slide4.xml><?xml version="1.0" encoding="utf-8"?>
+<p:sld xmlns:a="http://schemas.openxmlformats.org/drawingml/2006/main" xmlns:r="http://schemas.openxmlformats.org/officeDocument/2006/relationships" xmlns:p="http://schemas.openxmlformats.org/presentationml/2006/main">
+  <p:cSld>
+    <p:spTree>
+      <p:nvGrpSpPr>
+        <p:cNvPr id="1" name=""/>
+        <p:cNvGrpSpPr/>
+        <p:nvPr/>
+      </p:nvGrpSpPr>
+      <p:grpSpPr>
+        <a:xfrm>
+          <a:off x="0" y="0"/>
+          <a:ext cx="0" cy="0"/>
+          <a:chOff x="0" y="0"/>
+          <a:chExt cx="0" cy="0"/>
+        </a:xfrm>
+      </p:grpSpPr>
+      <p:sp>
+        <p:nvSpPr>
+          <p:cNvPr id="2" name="Title 1"/>
+          <p:cNvSpPr>
+            <a:spLocks noGrp="1"/>
+          </p:cNvSpPr>
+          <p:nvPr>
+            <p:ph type="title"/>
+          </p:nvPr>
+        </p:nvSpPr>
+        <p:spPr/>
+        <p:txBody>
+          <a:bodyPr>
+            <a:normAutofit fontScale="90000"/>
+          </a:bodyPr>
+          <a:lstStyle/>
+          <a:p>
+            <a:r>
+              <a:rPr lang="en-CA" dirty="0" smtClean="0"/>
+              <a:t>Syntactic Differences Compared with Handling DOM Elements</a:t>
+            </a:r>
+            <a:endParaRPr lang="en-CA" dirty="0"/>
+          </a:p>
+        </p:txBody>
+      </p:sp>
+      <p:sp>
+        <p:nvSpPr>
+          <p:cNvPr id="4" name="Text Placeholder 3"/>
+          <p:cNvSpPr>
+            <a:spLocks noGrp="1"/>
+          </p:cNvSpPr>
+          <p:nvPr>
+            <p:ph type="body" idx="1"/>
+          </p:nvPr>
+        </p:nvSpPr>
+        <p:spPr/>
+        <p:txBody>
+          <a:bodyPr>
+            <a:normAutofit/>
+          </a:bodyPr>
+          <a:lstStyle/>
+          <a:p>
+            <a:r>
+              <a:rPr lang="en-US" dirty="0" smtClean="0">
+                <a:effectLst>
+                  <a:outerShdw blurRad="38100" dist="38100" dir="2700000" algn="tl">
+                    <a:srgbClr val="000000">
+                      <a:alpha val="43137"/>
+                    </a:srgbClr>
+                  </a:outerShdw>
+                </a:effectLst>
+              </a:rPr>
+              <a:t>DOM</a:t>
+            </a:r>
+            <a:endParaRPr lang="en-CA" dirty="0">
+              <a:effectLst>
+                <a:outerShdw blurRad="38100" dist="38100" dir="2700000" algn="tl">
+                  <a:srgbClr val="000000">
+                    <a:alpha val="43137"/>
+                  </a:srgbClr>
+                </a:outerShdw>
+              </a:effectLst>
+            </a:endParaRPr>
+          </a:p>
+        </p:txBody>
+      </p:sp>
+      <p:sp>
+        <p:nvSpPr>
+          <p:cNvPr id="6" name="Text Placeholder 5"/>
+          <p:cNvSpPr>
+            <a:spLocks noGrp="1"/>
+          </p:cNvSpPr>
+          <p:nvPr>
+            <p:ph type="body" sz="half" idx="3"/>
+          </p:nvPr>
+        </p:nvSpPr>
+        <p:spPr/>
+        <p:txBody>
+          <a:bodyPr>
+            <a:normAutofit/>
+          </a:bodyPr>
+          <a:lstStyle/>
+          <a:p>
+            <a:r>
+              <a:rPr lang="en-US" dirty="0" smtClean="0">
+                <a:effectLst>
+                  <a:outerShdw blurRad="38100" dist="38100" dir="2700000" algn="tl">
+                    <a:srgbClr val="000000">
+                      <a:alpha val="43137"/>
+                    </a:srgbClr>
+                  </a:outerShdw>
+                </a:effectLst>
+              </a:rPr>
+              <a:t>React</a:t>
+            </a:r>
+            <a:endParaRPr lang="en-CA" dirty="0">
+              <a:effectLst>
+                <a:outerShdw blurRad="38100" dist="38100" dir="2700000" algn="tl">
+                  <a:srgbClr val="000000">
+                    <a:alpha val="43137"/>
+                  </a:srgbClr>
+                </a:outerShdw>
+              </a:effectLst>
+            </a:endParaRPr>
+          </a:p>
+        </p:txBody>
+      </p:sp>
+      <p:sp>
+        <p:nvSpPr>
+          <p:cNvPr id="5" name="Content Placeholder 4"/>
+          <p:cNvSpPr>
+            <a:spLocks noGrp="1"/>
+          </p:cNvSpPr>
+          <p:nvPr>
+            <p:ph sz="quarter" idx="2"/>
+          </p:nvPr>
+        </p:nvSpPr>
+        <p:spPr/>
+        <p:txBody>
+          <a:bodyPr>
+            <a:normAutofit/>
+          </a:bodyPr>
+          <a:lstStyle/>
+          <a:p>
+            <a:r>
+              <a:rPr lang="en-US" dirty="0" smtClean="0">
+                <a:effectLst>
+                  <a:outerShdw blurRad="38100" dist="38100" dir="2700000" algn="tl">
+                    <a:srgbClr val="000000">
+                      <a:alpha val="43137"/>
+                    </a:srgbClr>
+                  </a:outerShdw>
+                </a:effectLst>
+              </a:rPr>
+              <a:t>Events are lowercase</a:t>
+            </a:r>
+          </a:p>
+          <a:p>
+            <a:r>
+              <a:rPr lang="en-US" dirty="0" smtClean="0">
+                <a:effectLst>
+                  <a:outerShdw blurRad="38100" dist="38100" dir="2700000" algn="tl">
+                    <a:srgbClr val="000000">
+                      <a:alpha val="43137"/>
+                    </a:srgbClr>
+                  </a:outerShdw>
+                </a:effectLst>
+              </a:rPr>
+              <a:t>Event handlers are passed as strings.</a:t>
+            </a:r>
+          </a:p>
+          <a:p>
+            <a:endParaRPr lang="en-US" dirty="0">
+              <a:effectLst>
+                <a:outerShdw blurRad="38100" dist="38100" dir="2700000" algn="tl">
+                  <a:srgbClr val="000000">
+                    <a:alpha val="43137"/>
+                  </a:srgbClr>
+                </a:outerShdw>
+              </a:effectLst>
+            </a:endParaRPr>
+          </a:p>
+        </p:txBody>
+      </p:sp>
+      <p:sp>
+        <p:nvSpPr>
+          <p:cNvPr id="7" name="Content Placeholder 6"/>
+          <p:cNvSpPr>
+            <a:spLocks noGrp="1"/>
+          </p:cNvSpPr>
+          <p:nvPr>
+            <p:ph sz="quarter" idx="4"/>
+          </p:nvPr>
+        </p:nvSpPr>
+        <p:spPr/>
+        <p:txBody>
+          <a:bodyPr>
+            <a:normAutofit/>
+          </a:bodyPr>
+          <a:lstStyle/>
+          <a:p>
+            <a:r>
+              <a:rPr lang="en-US" dirty="0" smtClean="0">
+                <a:effectLst>
+                  <a:outerShdw blurRad="38100" dist="38100" dir="2700000" algn="tl">
+                    <a:srgbClr val="000000">
+                      <a:alpha val="43137"/>
+                    </a:srgbClr>
+                  </a:outerShdw>
+                </a:effectLst>
+              </a:rPr>
+              <a:t>Events are </a:t>
+            </a:r>
+            <a:r>
+              <a:rPr lang="en-US" dirty="0" err="1" smtClean="0">
+                <a:effectLst>
+                  <a:outerShdw blurRad="38100" dist="38100" dir="2700000" algn="tl">
+                    <a:srgbClr val="000000">
+                      <a:alpha val="43137"/>
+                    </a:srgbClr>
+                  </a:outerShdw>
+                </a:effectLst>
+              </a:rPr>
+              <a:t>camelCase</a:t>
+            </a:r>
+            <a:endParaRPr lang="en-US" dirty="0" smtClean="0">
+              <a:effectLst>
+                <a:outerShdw blurRad="38100" dist="38100" dir="2700000" algn="tl">
+                  <a:srgbClr val="000000">
+                    <a:alpha val="43137"/>
+                  </a:srgbClr>
+                </a:outerShdw>
+              </a:effectLst>
+            </a:endParaRPr>
+          </a:p>
+          <a:p>
+            <a:r>
+              <a:rPr lang="en-US" dirty="0" smtClean="0">
+                <a:effectLst>
+                  <a:outerShdw blurRad="38100" dist="38100" dir="2700000" algn="tl">
+                    <a:srgbClr val="000000">
+                      <a:alpha val="43137"/>
+                    </a:srgbClr>
+                  </a:outerShdw>
+                </a:effectLst>
+              </a:rPr>
+              <a:t>Event handlers are passed as functions.</a:t>
+            </a:r>
+          </a:p>
+          <a:p>
+            <a:endParaRPr lang="en-US" dirty="0">
+              <a:effectLst>
+                <a:outerShdw blurRad="38100" dist="38100" dir="2700000" algn="tl">
+                  <a:srgbClr val="000000">
+                    <a:alpha val="43137"/>
+                  </a:srgbClr>
+                </a:outerShdw>
+              </a:effectLst>
+            </a:endParaRPr>
+          </a:p>
+        </p:txBody>
+      </p:sp>
+    </p:spTree>
+    <p:extLst>
+      <p:ext uri="{BB962C8B-B14F-4D97-AF65-F5344CB8AC3E}">
+        <p14:creationId xmlns:p14="http://schemas.microsoft.com/office/powerpoint/2010/main" val="354590223"/>
+      </p:ext>
+    </p:extLst>
+  </p:cSld>
+  <p:clrMapOvr>
+    <a:masterClrMapping/>
+  </p:clrMapOvr>
+</p:sld>
+</file>
+
+<file path=ppt/slides/slide5.xml><?xml version="1.0" encoding="utf-8"?>
+<p:sld xmlns:a="http://schemas.openxmlformats.org/drawingml/2006/main" xmlns:r="http://schemas.openxmlformats.org/officeDocument/2006/relationships" xmlns:p="http://schemas.openxmlformats.org/presentationml/2006/main">
+  <p:cSld>
+    <p:spTree>
+      <p:nvGrpSpPr>
+        <p:cNvPr id="1" name=""/>
+        <p:cNvGrpSpPr/>
+        <p:nvPr/>
+      </p:nvGrpSpPr>
+      <p:grpSpPr>
+        <a:xfrm>
+          <a:off x="0" y="0"/>
+          <a:ext cx="0" cy="0"/>
+          <a:chOff x="0" y="0"/>
+          <a:chExt cx="0" cy="0"/>
+        </a:xfrm>
+      </p:grpSpPr>
+      <p:sp>
+        <p:nvSpPr>
+          <p:cNvPr id="2" name="Title 1"/>
+          <p:cNvSpPr>
+            <a:spLocks noGrp="1"/>
+          </p:cNvSpPr>
+          <p:nvPr>
+            <p:ph type="title"/>
+          </p:nvPr>
+        </p:nvSpPr>
+        <p:spPr/>
+        <p:txBody>
+          <a:bodyPr>
+            <a:normAutofit fontScale="90000"/>
+          </a:bodyPr>
+          <a:lstStyle/>
+          <a:p>
+            <a:r>
+              <a:rPr lang="en-CA" dirty="0" smtClean="0"/>
+              <a:t>Syntactic Differences Compared with Handling DOM Elements</a:t>
+            </a:r>
+            <a:endParaRPr lang="en-CA" dirty="0"/>
+          </a:p>
+        </p:txBody>
+      </p:sp>
+      <p:sp>
+        <p:nvSpPr>
+          <p:cNvPr id="4" name="Text Placeholder 3"/>
+          <p:cNvSpPr>
+            <a:spLocks noGrp="1"/>
+          </p:cNvSpPr>
+          <p:nvPr>
+            <p:ph type="body" idx="1"/>
+          </p:nvPr>
+        </p:nvSpPr>
+        <p:spPr/>
+        <p:txBody>
+          <a:bodyPr>
+            <a:normAutofit/>
+          </a:bodyPr>
+          <a:lstStyle/>
+          <a:p>
+            <a:r>
+              <a:rPr lang="en-US" dirty="0" smtClean="0">
+                <a:effectLst>
+                  <a:outerShdw blurRad="38100" dist="38100" dir="2700000" algn="tl">
+                    <a:srgbClr val="000000">
+                      <a:alpha val="43137"/>
+                    </a:srgbClr>
+                  </a:outerShdw>
+                </a:effectLst>
+              </a:rPr>
+              <a:t>DOM</a:t>
+            </a:r>
+            <a:endParaRPr lang="en-CA" dirty="0">
+              <a:effectLst>
+                <a:outerShdw blurRad="38100" dist="38100" dir="2700000" algn="tl">
+                  <a:srgbClr val="000000">
+                    <a:alpha val="43137"/>
+                  </a:srgbClr>
+                </a:outerShdw>
+              </a:effectLst>
+            </a:endParaRPr>
+          </a:p>
+        </p:txBody>
+      </p:sp>
+      <p:sp>
+        <p:nvSpPr>
+          <p:cNvPr id="6" name="Text Placeholder 5"/>
+          <p:cNvSpPr>
+            <a:spLocks noGrp="1"/>
+          </p:cNvSpPr>
+          <p:nvPr>
+            <p:ph type="body" sz="half" idx="3"/>
+          </p:nvPr>
+        </p:nvSpPr>
+        <p:spPr/>
+        <p:txBody>
+          <a:bodyPr>
+            <a:normAutofit/>
+          </a:bodyPr>
+          <a:lstStyle/>
+          <a:p>
+            <a:r>
+              <a:rPr lang="en-US" dirty="0" smtClean="0">
+                <a:effectLst>
+                  <a:outerShdw blurRad="38100" dist="38100" dir="2700000" algn="tl">
+                    <a:srgbClr val="000000">
+                      <a:alpha val="43137"/>
+                    </a:srgbClr>
+                  </a:outerShdw>
+                </a:effectLst>
+              </a:rPr>
+              <a:t>React</a:t>
+            </a:r>
+            <a:endParaRPr lang="en-CA" dirty="0">
+              <a:effectLst>
+                <a:outerShdw blurRad="38100" dist="38100" dir="2700000" algn="tl">
+                  <a:srgbClr val="000000">
+                    <a:alpha val="43137"/>
+                  </a:srgbClr>
+                </a:outerShdw>
+              </a:effectLst>
+            </a:endParaRPr>
+          </a:p>
+        </p:txBody>
+      </p:sp>
+      <p:sp>
+        <p:nvSpPr>
+          <p:cNvPr id="5" name="Content Placeholder 4"/>
+          <p:cNvSpPr>
+            <a:spLocks noGrp="1"/>
+          </p:cNvSpPr>
+          <p:nvPr>
+            <p:ph sz="quarter" idx="2"/>
+          </p:nvPr>
+        </p:nvSpPr>
+        <p:spPr/>
+        <p:txBody>
+          <a:bodyPr>
+            <a:normAutofit/>
+          </a:bodyPr>
+          <a:lstStyle/>
+          <a:p>
+            <a:r>
+              <a:rPr lang="en-US" dirty="0" smtClean="0">
+                <a:effectLst>
+                  <a:outerShdw blurRad="38100" dist="38100" dir="2700000" algn="tl">
+                    <a:srgbClr val="000000">
+                      <a:alpha val="43137"/>
+                    </a:srgbClr>
+                  </a:outerShdw>
+                </a:effectLst>
+              </a:rPr>
+              <a:t>Events are lowercase</a:t>
+            </a:r>
+          </a:p>
+          <a:p>
+            <a:r>
+              <a:rPr lang="en-US" dirty="0" smtClean="0">
+                <a:effectLst>
+                  <a:outerShdw blurRad="38100" dist="38100" dir="2700000" algn="tl">
+                    <a:srgbClr val="000000">
+                      <a:alpha val="43137"/>
+                    </a:srgbClr>
+                  </a:outerShdw>
+                </a:effectLst>
+              </a:rPr>
+              <a:t>Event handlers are passed as strings.</a:t>
+            </a:r>
+          </a:p>
+          <a:p>
+            <a:endParaRPr lang="en-US" dirty="0">
+              <a:effectLst>
+                <a:outerShdw blurRad="38100" dist="38100" dir="2700000" algn="tl">
+                  <a:srgbClr val="000000">
+                    <a:alpha val="43137"/>
+                  </a:srgbClr>
+                </a:outerShdw>
+              </a:effectLst>
+            </a:endParaRPr>
+          </a:p>
+          <a:p>
+            <a:pPr marL="0" indent="0">
+              <a:buNone/>
+            </a:pPr>
+            <a:r>
+              <a:rPr lang="en-US" dirty="0" smtClean="0">
+                <a:effectLst>
+                  <a:outerShdw blurRad="38100" dist="38100" dir="2700000" algn="tl">
+                    <a:srgbClr val="000000">
+                      <a:alpha val="43137"/>
+                    </a:srgbClr>
+                  </a:outerShdw>
+                </a:effectLst>
+              </a:rPr>
+              <a:t>Example:</a:t>
+            </a:r>
+          </a:p>
+          <a:p>
+            <a:pPr marL="0" indent="0">
+              <a:buNone/>
+            </a:pPr>
+            <a:r>
+              <a:rPr lang="en-US" dirty="0">
+                <a:effectLst>
+                  <a:outerShdw blurRad="38100" dist="38100" dir="2700000" algn="tl">
+                    <a:srgbClr val="000000">
+                      <a:alpha val="43137"/>
+                    </a:srgbClr>
+                  </a:outerShdw>
+                </a:effectLst>
+              </a:rPr>
+              <a:t>&lt;button </a:t>
+            </a:r>
+            <a:r>
+              <a:rPr lang="en-US" dirty="0" err="1">
+                <a:effectLst>
+                  <a:outerShdw blurRad="38100" dist="38100" dir="2700000" algn="tl">
+                    <a:srgbClr val="000000">
+                      <a:alpha val="43137"/>
+                    </a:srgbClr>
+                  </a:outerShdw>
+                </a:effectLst>
+              </a:rPr>
+              <a:t>onclick</a:t>
+            </a:r>
+            <a:r>
+              <a:rPr lang="en-US" dirty="0" smtClean="0">
+                <a:effectLst>
+                  <a:outerShdw blurRad="38100" dist="38100" dir="2700000" algn="tl">
+                    <a:srgbClr val="000000">
+                      <a:alpha val="43137"/>
+                    </a:srgbClr>
+                  </a:outerShdw>
+                </a:effectLst>
+              </a:rPr>
+              <a:t>=“</a:t>
+            </a:r>
+            <a:r>
+              <a:rPr lang="en-US" dirty="0" err="1" smtClean="0">
+                <a:effectLst>
+                  <a:outerShdw blurRad="38100" dist="38100" dir="2700000" algn="tl">
+                    <a:srgbClr val="000000">
+                      <a:alpha val="43137"/>
+                    </a:srgbClr>
+                  </a:outerShdw>
+                </a:effectLst>
+              </a:rPr>
+              <a:t>helloWorld</a:t>
+            </a:r>
+            <a:r>
+              <a:rPr lang="en-US" dirty="0" smtClean="0">
+                <a:effectLst>
+                  <a:outerShdw blurRad="38100" dist="38100" dir="2700000" algn="tl">
+                    <a:srgbClr val="000000">
+                      <a:alpha val="43137"/>
+                    </a:srgbClr>
+                  </a:outerShdw>
+                </a:effectLst>
+              </a:rPr>
+              <a:t>()"&gt; Hello World!&lt;/</a:t>
+            </a:r>
+            <a:r>
+              <a:rPr lang="en-US" dirty="0">
+                <a:effectLst>
+                  <a:outerShdw blurRad="38100" dist="38100" dir="2700000" algn="tl">
+                    <a:srgbClr val="000000">
+                      <a:alpha val="43137"/>
+                    </a:srgbClr>
+                  </a:outerShdw>
+                </a:effectLst>
+              </a:rPr>
+              <a:t>button&gt;</a:t>
+            </a:r>
+            <a:endParaRPr lang="en-CA" dirty="0">
+              <a:effectLst>
+                <a:outerShdw blurRad="38100" dist="38100" dir="2700000" algn="tl">
+                  <a:srgbClr val="000000">
+                    <a:alpha val="43137"/>
+                  </a:srgbClr>
+                </a:outerShdw>
+              </a:effectLst>
+            </a:endParaRPr>
+          </a:p>
+        </p:txBody>
+      </p:sp>
+      <p:sp>
+        <p:nvSpPr>
+          <p:cNvPr id="7" name="Content Placeholder 6"/>
+          <p:cNvSpPr>
+            <a:spLocks noGrp="1"/>
+          </p:cNvSpPr>
+          <p:nvPr>
+            <p:ph sz="quarter" idx="4"/>
+          </p:nvPr>
+        </p:nvSpPr>
+        <p:spPr/>
+        <p:txBody>
+          <a:bodyPr>
+            <a:normAutofit/>
+          </a:bodyPr>
+          <a:lstStyle/>
+          <a:p>
+            <a:r>
+              <a:rPr lang="en-US" dirty="0" smtClean="0">
+                <a:effectLst>
+                  <a:outerShdw blurRad="38100" dist="38100" dir="2700000" algn="tl">
+                    <a:srgbClr val="000000">
+                      <a:alpha val="43137"/>
+                    </a:srgbClr>
+                  </a:outerShdw>
+                </a:effectLst>
+              </a:rPr>
+              <a:t>Events are </a:t>
+            </a:r>
+            <a:r>
+              <a:rPr lang="en-US" dirty="0" err="1" smtClean="0">
+                <a:effectLst>
+                  <a:outerShdw blurRad="38100" dist="38100" dir="2700000" algn="tl">
+                    <a:srgbClr val="000000">
+                      <a:alpha val="43137"/>
+                    </a:srgbClr>
+                  </a:outerShdw>
+                </a:effectLst>
+              </a:rPr>
+              <a:t>camelCase</a:t>
+            </a:r>
+            <a:endParaRPr lang="en-US" dirty="0" smtClean="0">
+              <a:effectLst>
+                <a:outerShdw blurRad="38100" dist="38100" dir="2700000" algn="tl">
+                  <a:srgbClr val="000000">
+                    <a:alpha val="43137"/>
+                  </a:srgbClr>
+                </a:outerShdw>
+              </a:effectLst>
+            </a:endParaRPr>
+          </a:p>
+          <a:p>
+            <a:r>
+              <a:rPr lang="en-US" dirty="0" smtClean="0">
+                <a:effectLst>
+                  <a:outerShdw blurRad="38100" dist="38100" dir="2700000" algn="tl">
+                    <a:srgbClr val="000000">
+                      <a:alpha val="43137"/>
+                    </a:srgbClr>
+                  </a:outerShdw>
+                </a:effectLst>
+              </a:rPr>
+              <a:t>Event handlers are passed as functions.</a:t>
+            </a:r>
+          </a:p>
+          <a:p>
+            <a:endParaRPr lang="en-US" dirty="0">
+              <a:effectLst>
+                <a:outerShdw blurRad="38100" dist="38100" dir="2700000" algn="tl">
+                  <a:srgbClr val="000000">
+                    <a:alpha val="43137"/>
+                  </a:srgbClr>
+                </a:outerShdw>
+              </a:effectLst>
+            </a:endParaRPr>
+          </a:p>
+          <a:p>
+            <a:pPr marL="0" indent="0">
+              <a:buNone/>
+            </a:pPr>
+            <a:r>
+              <a:rPr lang="en-US" dirty="0" smtClean="0">
+                <a:effectLst>
+                  <a:outerShdw blurRad="38100" dist="38100" dir="2700000" algn="tl">
+                    <a:srgbClr val="000000">
+                      <a:alpha val="43137"/>
+                    </a:srgbClr>
+                  </a:outerShdw>
+                </a:effectLst>
+              </a:rPr>
+              <a:t>Example:</a:t>
+            </a:r>
+          </a:p>
+          <a:p>
+            <a:pPr marL="0" indent="0">
+              <a:buNone/>
+            </a:pPr>
+            <a:r>
+              <a:rPr lang="en-US" dirty="0">
+                <a:effectLst>
+                  <a:outerShdw blurRad="38100" dist="38100" dir="2700000" algn="tl">
+                    <a:srgbClr val="000000">
+                      <a:alpha val="43137"/>
+                    </a:srgbClr>
+                  </a:outerShdw>
+                </a:effectLst>
+              </a:rPr>
+              <a:t>&lt;button </a:t>
+            </a:r>
+            <a:r>
+              <a:rPr lang="en-US" dirty="0" err="1">
+                <a:effectLst>
+                  <a:outerShdw blurRad="38100" dist="38100" dir="2700000" algn="tl">
+                    <a:srgbClr val="000000">
+                      <a:alpha val="43137"/>
+                    </a:srgbClr>
+                  </a:outerShdw>
+                </a:effectLst>
+              </a:rPr>
+              <a:t>onClick</a:t>
+            </a:r>
+            <a:r>
+              <a:rPr lang="en-US" dirty="0" smtClean="0">
+                <a:effectLst>
+                  <a:outerShdw blurRad="38100" dist="38100" dir="2700000" algn="tl">
+                    <a:srgbClr val="000000">
+                      <a:alpha val="43137"/>
+                    </a:srgbClr>
+                  </a:outerShdw>
+                </a:effectLst>
+              </a:rPr>
+              <a:t>={</a:t>
+            </a:r>
+            <a:r>
+              <a:rPr lang="en-US" dirty="0" err="1" smtClean="0">
+                <a:effectLst>
+                  <a:outerShdw blurRad="38100" dist="38100" dir="2700000" algn="tl">
+                    <a:srgbClr val="000000">
+                      <a:alpha val="43137"/>
+                    </a:srgbClr>
+                  </a:outerShdw>
+                </a:effectLst>
+              </a:rPr>
+              <a:t>helloWorld</a:t>
+            </a:r>
+            <a:r>
+              <a:rPr lang="en-US" dirty="0" smtClean="0">
+                <a:effectLst>
+                  <a:outerShdw blurRad="38100" dist="38100" dir="2700000" algn="tl">
+                    <a:srgbClr val="000000">
+                      <a:alpha val="43137"/>
+                    </a:srgbClr>
+                  </a:outerShdw>
+                </a:effectLst>
+              </a:rPr>
+              <a:t>}&gt; Hello World! </a:t>
+            </a:r>
+            <a:r>
+              <a:rPr lang="en-US" dirty="0">
+                <a:effectLst>
+                  <a:outerShdw blurRad="38100" dist="38100" dir="2700000" algn="tl">
+                    <a:srgbClr val="000000">
+                      <a:alpha val="43137"/>
+                    </a:srgbClr>
+                  </a:outerShdw>
+                </a:effectLst>
+              </a:rPr>
+              <a:t>&lt;/button&gt;</a:t>
+            </a:r>
+            <a:endParaRPr lang="en-CA" dirty="0">
+              <a:effectLst>
+                <a:outerShdw blurRad="38100" dist="38100" dir="2700000" algn="tl">
+                  <a:srgbClr val="000000">
+                    <a:alpha val="43137"/>
+                  </a:srgbClr>
+                </a:outerShdw>
+              </a:effectLst>
+            </a:endParaRPr>
+          </a:p>
+        </p:txBody>
+      </p:sp>
+    </p:spTree>
+    <p:extLst>
+      <p:ext uri="{BB962C8B-B14F-4D97-AF65-F5344CB8AC3E}">
+        <p14:creationId xmlns:p14="http://schemas.microsoft.com/office/powerpoint/2010/main" val="4169195338"/>
+      </p:ext>
+    </p:extLst>
+  </p:cSld>
+  <p:clrMapOvr>
+    <a:masterClrMapping/>
+  </p:clrMapOvr>
+  <p:timing>
+    <p:tnLst>
+      <p:par>
+        <p:cTn id="1" dur="indefinite" restart="never" nodeType="tmRoot"/>
+      </p:par>
+    </p:tnLst>
+  </p:timing>
+</p:sld>
+</file>
+
+<file path=ppt/slides/slide6.xml><?xml version="1.0" encoding="utf-8"?>
 <p:sld xmlns:a="http://schemas.openxmlformats.org/drawingml/2006/main" xmlns:r="http://schemas.openxmlformats.org/officeDocument/2006/relationships" xmlns:p="http://schemas.openxmlformats.org/presentationml/2006/main">
   <p:cSld>
     <p:spTree>
@@ -4450,7 +5381,7 @@
 </p:sld>
 </file>
 
-<file path=ppt/slides/slide4.xml><?xml version="1.0" encoding="utf-8"?>
+<file path=ppt/slides/slide7.xml><?xml version="1.0" encoding="utf-8"?>
 <p:sld xmlns:a="http://schemas.openxmlformats.org/drawingml/2006/main" xmlns:r="http://schemas.openxmlformats.org/officeDocument/2006/relationships" xmlns:p="http://schemas.openxmlformats.org/presentationml/2006/main">
   <p:cSld>
     <p:spTree>
@@ -4477,10 +5408,33 @@
             <p:ph type="title"/>
           </p:nvPr>
         </p:nvSpPr>
+        <p:spPr/>
+        <p:txBody>
+          <a:bodyPr/>
+          <a:lstStyle/>
+          <a:p>
+            <a:r>
+              <a:rPr lang="en-CA" dirty="0" smtClean="0"/>
+              <a:t>Prevent Default</a:t>
+            </a:r>
+            <a:endParaRPr lang="en-CA" dirty="0"/>
+          </a:p>
+        </p:txBody>
+      </p:sp>
+      <p:sp>
+        <p:nvSpPr>
+          <p:cNvPr id="3" name="Content Placeholder 2"/>
+          <p:cNvSpPr>
+            <a:spLocks noGrp="1"/>
+          </p:cNvSpPr>
+          <p:nvPr>
+            <p:ph idx="1"/>
+          </p:nvPr>
+        </p:nvSpPr>
         <p:spPr>
           <a:xfrm>
-            <a:off x="457200" y="274638"/>
-            <a:ext cx="8229600" cy="1642194"/>
+            <a:off x="459468" y="1196752"/>
+            <a:ext cx="8229600" cy="5410999"/>
           </a:xfrm>
         </p:spPr>
         <p:txBody>
@@ -4490,25 +5444,244 @@
           <a:lstStyle/>
           <a:p>
             <a:r>
-              <a:rPr lang="en-CA" dirty="0" smtClean="0"/>
-              <a:t>All Around Good Dude, Tyler Armitage</a:t>
-            </a:r>
-            <a:endParaRPr lang="en-CA" dirty="0"/>
+              <a:rPr lang="en-US" sz="1800" dirty="0">
+                <a:effectLst>
+                  <a:outerShdw blurRad="38100" dist="38100" dir="2700000" algn="tl">
+                    <a:srgbClr val="000000">
+                      <a:alpha val="43137"/>
+                    </a:srgbClr>
+                  </a:outerShdw>
+                </a:effectLst>
+              </a:rPr>
+              <a:t>All native HTML elements come with their internal native </a:t>
+            </a:r>
+            <a:r>
+              <a:rPr lang="en-US" sz="1800" dirty="0" err="1">
+                <a:effectLst>
+                  <a:outerShdw blurRad="38100" dist="38100" dir="2700000" algn="tl">
+                    <a:srgbClr val="000000">
+                      <a:alpha val="43137"/>
+                    </a:srgbClr>
+                  </a:outerShdw>
+                </a:effectLst>
+              </a:rPr>
+              <a:t>behaviour</a:t>
+            </a:r>
+            <a:r>
+              <a:rPr lang="en-US" sz="1800" dirty="0">
+                <a:effectLst>
+                  <a:outerShdw blurRad="38100" dist="38100" dir="2700000" algn="tl">
+                    <a:srgbClr val="000000">
+                      <a:alpha val="43137"/>
+                    </a:srgbClr>
+                  </a:outerShdw>
+                </a:effectLst>
+              </a:rPr>
+              <a:t>. </a:t>
+            </a:r>
+            <a:endParaRPr lang="en-US" sz="1800" dirty="0" smtClean="0">
+              <a:effectLst>
+                <a:outerShdw blurRad="38100" dist="38100" dir="2700000" algn="tl">
+                  <a:srgbClr val="000000">
+                    <a:alpha val="43137"/>
+                  </a:srgbClr>
+                </a:outerShdw>
+              </a:effectLst>
+            </a:endParaRPr>
+          </a:p>
+          <a:p>
+            <a:r>
+              <a:rPr lang="en-US" sz="1800" dirty="0" smtClean="0">
+                <a:effectLst>
+                  <a:outerShdw blurRad="38100" dist="38100" dir="2700000" algn="tl">
+                    <a:srgbClr val="000000">
+                      <a:alpha val="43137"/>
+                    </a:srgbClr>
+                  </a:outerShdw>
+                </a:effectLst>
+              </a:rPr>
+              <a:t>In React, you can’t return false to prevent a default </a:t>
+            </a:r>
+            <a:r>
+              <a:rPr lang="en-US" sz="1800" dirty="0" err="1" smtClean="0">
+                <a:effectLst>
+                  <a:outerShdw blurRad="38100" dist="38100" dir="2700000" algn="tl">
+                    <a:srgbClr val="000000">
+                      <a:alpha val="43137"/>
+                    </a:srgbClr>
+                  </a:outerShdw>
+                </a:effectLst>
+              </a:rPr>
+              <a:t>behaviour</a:t>
+            </a:r>
+            <a:r>
+              <a:rPr lang="en-US" sz="1800" dirty="0" smtClean="0">
+                <a:effectLst>
+                  <a:outerShdw blurRad="38100" dist="38100" dir="2700000" algn="tl">
+                    <a:srgbClr val="000000">
+                      <a:alpha val="43137"/>
+                    </a:srgbClr>
+                  </a:outerShdw>
+                </a:effectLst>
+              </a:rPr>
+              <a:t>. If there is a default </a:t>
+            </a:r>
+            <a:r>
+              <a:rPr lang="en-US" sz="1800" dirty="0" err="1" smtClean="0">
+                <a:effectLst>
+                  <a:outerShdw blurRad="38100" dist="38100" dir="2700000" algn="tl">
+                    <a:srgbClr val="000000">
+                      <a:alpha val="43137"/>
+                    </a:srgbClr>
+                  </a:outerShdw>
+                </a:effectLst>
+              </a:rPr>
+              <a:t>behaviour</a:t>
+            </a:r>
+            <a:r>
+              <a:rPr lang="en-US" sz="1800" dirty="0" smtClean="0">
+                <a:effectLst>
+                  <a:outerShdw blurRad="38100" dist="38100" dir="2700000" algn="tl">
+                    <a:srgbClr val="000000">
+                      <a:alpha val="43137"/>
+                    </a:srgbClr>
+                  </a:outerShdw>
+                </a:effectLst>
+              </a:rPr>
+              <a:t> that you are trying to prevent, you must call </a:t>
+            </a:r>
+            <a:r>
+              <a:rPr lang="en-US" sz="1800" dirty="0" err="1" smtClean="0">
+                <a:effectLst>
+                  <a:outerShdw blurRad="38100" dist="38100" dir="2700000" algn="tl">
+                    <a:srgbClr val="000000">
+                      <a:alpha val="43137"/>
+                    </a:srgbClr>
+                  </a:outerShdw>
+                </a:effectLst>
+              </a:rPr>
+              <a:t>preventDefault</a:t>
+            </a:r>
+            <a:r>
+              <a:rPr lang="en-US" sz="1800" dirty="0" smtClean="0">
+                <a:effectLst>
+                  <a:outerShdw blurRad="38100" dist="38100" dir="2700000" algn="tl">
+                    <a:srgbClr val="000000">
+                      <a:alpha val="43137"/>
+                    </a:srgbClr>
+                  </a:outerShdw>
+                </a:effectLst>
+              </a:rPr>
+              <a:t>() explicitly.</a:t>
+            </a:r>
+          </a:p>
+          <a:p>
+            <a:r>
+              <a:rPr lang="en-US" sz="1800" dirty="0" smtClean="0">
+                <a:effectLst>
+                  <a:outerShdw blurRad="38100" dist="38100" dir="2700000" algn="tl">
+                    <a:srgbClr val="000000">
+                      <a:alpha val="43137"/>
+                    </a:srgbClr>
+                  </a:outerShdw>
+                </a:effectLst>
+              </a:rPr>
+              <a:t>In the following example from when I migrated </a:t>
+            </a:r>
+            <a:r>
+              <a:rPr lang="en-US" sz="1800" dirty="0" err="1" smtClean="0">
+                <a:effectLst>
+                  <a:outerShdw blurRad="38100" dist="38100" dir="2700000" algn="tl">
+                    <a:srgbClr val="000000">
+                      <a:alpha val="43137"/>
+                    </a:srgbClr>
+                  </a:outerShdw>
+                </a:effectLst>
+              </a:rPr>
+              <a:t>myAccounts</a:t>
+            </a:r>
+            <a:r>
+              <a:rPr lang="en-US" sz="1800" dirty="0" smtClean="0">
+                <a:effectLst>
+                  <a:outerShdw blurRad="38100" dist="38100" dir="2700000" algn="tl">
+                    <a:srgbClr val="000000">
+                      <a:alpha val="43137"/>
+                    </a:srgbClr>
+                  </a:outerShdw>
+                </a:effectLst>
+              </a:rPr>
+              <a:t> exercise, </a:t>
+            </a:r>
+            <a:r>
+              <a:rPr lang="en-US" sz="1800" dirty="0" err="1" smtClean="0">
+                <a:effectLst>
+                  <a:outerShdw blurRad="38100" dist="38100" dir="2700000" algn="tl">
+                    <a:srgbClr val="000000">
+                      <a:alpha val="43137"/>
+                    </a:srgbClr>
+                  </a:outerShdw>
+                </a:effectLst>
+              </a:rPr>
+              <a:t>preventDefault</a:t>
+            </a:r>
+            <a:r>
+              <a:rPr lang="en-US" sz="1800" dirty="0" smtClean="0">
+                <a:effectLst>
+                  <a:outerShdw blurRad="38100" dist="38100" dir="2700000" algn="tl">
+                    <a:srgbClr val="000000">
+                      <a:alpha val="43137"/>
+                    </a:srgbClr>
+                  </a:outerShdw>
+                </a:effectLst>
+              </a:rPr>
+              <a:t>() was used to prevent the default </a:t>
+            </a:r>
+            <a:r>
+              <a:rPr lang="en-US" sz="1800" dirty="0" err="1" smtClean="0">
+                <a:effectLst>
+                  <a:outerShdw blurRad="38100" dist="38100" dir="2700000" algn="tl">
+                    <a:srgbClr val="000000">
+                      <a:alpha val="43137"/>
+                    </a:srgbClr>
+                  </a:outerShdw>
+                </a:effectLst>
+              </a:rPr>
+              <a:t>behaviour</a:t>
+            </a:r>
+            <a:r>
+              <a:rPr lang="en-US" sz="1800" dirty="0" smtClean="0">
+                <a:effectLst>
+                  <a:outerShdw blurRad="38100" dist="38100" dir="2700000" algn="tl">
+                    <a:srgbClr val="000000">
+                      <a:alpha val="43137"/>
+                    </a:srgbClr>
+                  </a:outerShdw>
+                </a:effectLst>
+              </a:rPr>
+              <a:t> of a form submit button, which would normally refresh the browser when it is clicked.</a:t>
+            </a:r>
+            <a:endParaRPr lang="en-CA" sz="1800" dirty="0">
+              <a:effectLst>
+                <a:outerShdw blurRad="38100" dist="38100" dir="2700000" algn="tl">
+                  <a:srgbClr val="000000">
+                    <a:alpha val="43137"/>
+                  </a:srgbClr>
+                </a:outerShdw>
+              </a:effectLst>
+            </a:endParaRPr>
           </a:p>
         </p:txBody>
       </p:sp>
       <p:pic>
         <p:nvPicPr>
-          <p:cNvPr id="2050" name="Picture 2"/>
+          <p:cNvPr id="1026" name="Picture 2"/>
           <p:cNvPicPr>
-            <a:picLocks noGrp="1" noChangeAspect="1" noChangeArrowheads="1"/>
+            <a:picLocks noChangeAspect="1" noChangeArrowheads="1"/>
           </p:cNvPicPr>
-          <p:nvPr>
-            <p:ph idx="1"/>
-          </p:nvPr>
+          <p:nvPr/>
         </p:nvPicPr>
         <p:blipFill>
-          <a:blip r:embed="rId2">
+          <a:blip r:embed="rId3">
             <a:extLst>
               <a:ext uri="{28A0092B-C50C-407E-A947-70E740481C1C}">
                 <a14:useLocalDpi xmlns:a14="http://schemas.microsoft.com/office/drawing/2010/main" val="0"/>
@@ -4522,8 +5695,8 @@
         </p:blipFill>
         <p:spPr bwMode="auto">
           <a:xfrm>
-            <a:off x="3059832" y="2204864"/>
-            <a:ext cx="3095625" cy="2962275"/>
+            <a:off x="1364343" y="3513695"/>
+            <a:ext cx="6419850" cy="3200400"/>
           </a:xfrm>
           <a:prstGeom prst="rect">
             <a:avLst/>
@@ -4553,78 +5726,62 @@
           </a:extLst>
         </p:spPr>
       </p:pic>
-    </p:spTree>
-    <p:extLst>
-      <p:ext uri="{BB962C8B-B14F-4D97-AF65-F5344CB8AC3E}">
-        <p14:creationId xmlns:p14="http://schemas.microsoft.com/office/powerpoint/2010/main" val="2143214401"/>
-      </p:ext>
-    </p:extLst>
-  </p:cSld>
-  <p:clrMapOvr>
-    <a:masterClrMapping/>
-  </p:clrMapOvr>
-</p:sld>
-</file>
-
-<file path=ppt/slides/slide5.xml><?xml version="1.0" encoding="utf-8"?>
-<p:sld xmlns:a="http://schemas.openxmlformats.org/drawingml/2006/main" xmlns:r="http://schemas.openxmlformats.org/officeDocument/2006/relationships" xmlns:p="http://schemas.openxmlformats.org/presentationml/2006/main">
-  <p:cSld>
-    <p:spTree>
-      <p:nvGrpSpPr>
-        <p:cNvPr id="1" name=""/>
-        <p:cNvGrpSpPr/>
-        <p:nvPr/>
-      </p:nvGrpSpPr>
-      <p:grpSpPr>
-        <a:xfrm>
-          <a:off x="0" y="0"/>
-          <a:ext cx="0" cy="0"/>
-          <a:chOff x="0" y="0"/>
-          <a:chExt cx="0" cy="0"/>
-        </a:xfrm>
-      </p:grpSpPr>
-      <p:sp>
-        <p:nvSpPr>
-          <p:cNvPr id="2" name="Title 1"/>
-          <p:cNvSpPr>
-            <a:spLocks noGrp="1"/>
-          </p:cNvSpPr>
-          <p:nvPr>
-            <p:ph type="title"/>
-          </p:nvPr>
+      <p:sp>
+        <p:nvSpPr>
+          <p:cNvPr id="4" name="Oval 3"/>
+          <p:cNvSpPr/>
+          <p:nvPr/>
         </p:nvSpPr>
         <p:spPr>
           <a:xfrm>
-            <a:off x="457200" y="274638"/>
-            <a:ext cx="8229600" cy="1642194"/>
+            <a:off x="1489578" y="6227825"/>
+            <a:ext cx="2304256" cy="216024"/>
           </a:xfrm>
+          <a:prstGeom prst="ellipse">
+            <a:avLst/>
+          </a:prstGeom>
+          <a:noFill/>
+          <a:ln>
+            <a:solidFill>
+              <a:srgbClr val="FFFF00"/>
+            </a:solidFill>
+          </a:ln>
         </p:spPr>
-        <p:txBody>
-          <a:bodyPr>
-            <a:normAutofit/>
-          </a:bodyPr>
-          <a:lstStyle/>
-          <a:p>
-            <a:r>
-              <a:rPr lang="en-CA" dirty="0" smtClean="0"/>
-              <a:t>AGENT OF REACT PRESENTATION CHAOS</a:t>
-            </a:r>
-            <a:endParaRPr lang="en-CA" dirty="0"/>
+        <p:style>
+          <a:lnRef idx="2">
+            <a:schemeClr val="accent1">
+              <a:shade val="50000"/>
+            </a:schemeClr>
+          </a:lnRef>
+          <a:fillRef idx="1">
+            <a:schemeClr val="accent1"/>
+          </a:fillRef>
+          <a:effectRef idx="0">
+            <a:schemeClr val="accent1"/>
+          </a:effectRef>
+          <a:fontRef idx="minor">
+            <a:schemeClr val="lt1"/>
+          </a:fontRef>
+        </p:style>
+        <p:txBody>
+          <a:bodyPr rtlCol="0" anchor="ctr"/>
+          <a:lstStyle/>
+          <a:p>
+            <a:pPr algn="ctr"/>
+            <a:endParaRPr lang="en-CA"/>
           </a:p>
         </p:txBody>
       </p:sp>
       <p:pic>
         <p:nvPicPr>
-          <p:cNvPr id="2050" name="Picture 2"/>
+          <p:cNvPr id="4098" name="Picture 2"/>
           <p:cNvPicPr>
-            <a:picLocks noGrp="1" noChangeAspect="1" noChangeArrowheads="1"/>
+            <a:picLocks noChangeAspect="1" noChangeArrowheads="1"/>
           </p:cNvPicPr>
-          <p:nvPr>
-            <p:ph idx="1"/>
-          </p:nvPr>
+          <p:nvPr/>
         </p:nvPicPr>
         <p:blipFill>
-          <a:blip r:embed="rId2">
+          <a:blip r:embed="rId4">
             <a:extLst>
               <a:ext uri="{28A0092B-C50C-407E-A947-70E740481C1C}">
                 <a14:useLocalDpi xmlns:a14="http://schemas.microsoft.com/office/drawing/2010/main" val="0"/>
@@ -4638,62 +5795,8 @@
         </p:blipFill>
         <p:spPr bwMode="auto">
           <a:xfrm>
-            <a:off x="3024187" y="2473325"/>
-            <a:ext cx="3095625" cy="2962275"/>
-          </a:xfrm>
-          <a:prstGeom prst="rect">
-            <a:avLst/>
-          </a:prstGeom>
-          <a:noFill/>
-          <a:ln>
-            <a:noFill/>
-          </a:ln>
-          <a:extLst>
-            <a:ext uri="{909E8E84-426E-40DD-AFC4-6F175D3DCCD1}">
-              <a14:hiddenFill xmlns:a14="http://schemas.microsoft.com/office/drawing/2010/main">
-                <a:solidFill>
-                  <a:schemeClr val="accent1"/>
-                </a:solidFill>
-              </a14:hiddenFill>
-            </a:ext>
-            <a:ext uri="{91240B29-F687-4F45-9708-019B960494DF}">
-              <a14:hiddenLine xmlns:a14="http://schemas.microsoft.com/office/drawing/2010/main" w="9525">
-                <a:solidFill>
-                  <a:schemeClr val="tx1"/>
-                </a:solidFill>
-                <a:miter lim="800000"/>
-                <a:headEnd/>
-                <a:tailEnd/>
-              </a14:hiddenLine>
-            </a:ext>
-          </a:extLst>
-        </p:spPr>
-      </p:pic>
-      <p:pic>
-        <p:nvPicPr>
-          <p:cNvPr id="3074" name="Picture 2"/>
-          <p:cNvPicPr>
-            <a:picLocks noChangeAspect="1" noChangeArrowheads="1"/>
-          </p:cNvPicPr>
-          <p:nvPr/>
-        </p:nvPicPr>
-        <p:blipFill>
-          <a:blip r:embed="rId3">
-            <a:extLst>
-              <a:ext uri="{28A0092B-C50C-407E-A947-70E740481C1C}">
-                <a14:useLocalDpi xmlns:a14="http://schemas.microsoft.com/office/drawing/2010/main" val="0"/>
-              </a:ext>
-            </a:extLst>
-          </a:blip>
-          <a:srcRect/>
-          <a:stretch>
-            <a:fillRect/>
-          </a:stretch>
-        </p:blipFill>
-        <p:spPr bwMode="auto">
-          <a:xfrm>
-            <a:off x="2527458" y="1916832"/>
-            <a:ext cx="4103687" cy="3924300"/>
+            <a:off x="3022599" y="2276872"/>
+            <a:ext cx="3097213" cy="2962275"/>
           </a:xfrm>
           <a:prstGeom prst="rect">
             <a:avLst/>
@@ -4733,20 +5836,88 @@
           </a:extLst>
         </p:spPr>
       </p:pic>
+      <p:sp>
+        <p:nvSpPr>
+          <p:cNvPr id="5" name="Rectangle 4"/>
+          <p:cNvSpPr/>
+          <p:nvPr/>
+        </p:nvSpPr>
+        <p:spPr>
+          <a:xfrm rot="748247">
+            <a:off x="1751771" y="954681"/>
+            <a:ext cx="5892203" cy="1200329"/>
+          </a:xfrm>
+          <a:prstGeom prst="rect">
+            <a:avLst/>
+          </a:prstGeom>
+          <a:noFill/>
+        </p:spPr>
+        <p:txBody>
+          <a:bodyPr wrap="square" lIns="91440" tIns="45720" rIns="91440" bIns="45720">
+            <a:spAutoFit/>
+            <a:scene3d>
+              <a:camera prst="isometricOffAxis2Left"/>
+              <a:lightRig rig="balanced" dir="t">
+                <a:rot lat="0" lon="0" rev="2100000"/>
+              </a:lightRig>
+            </a:scene3d>
+            <a:sp3d extrusionH="57150" prstMaterial="metal">
+              <a:bevelT w="38100" h="25400"/>
+              <a:contourClr>
+                <a:schemeClr val="bg2"/>
+              </a:contourClr>
+            </a:sp3d>
+          </a:bodyPr>
+          <a:lstStyle/>
+          <a:p>
+            <a:pPr algn="ctr"/>
+            <a:r>
+              <a:rPr lang="en-US" sz="7200" b="1" dirty="0" smtClean="0">
+                <a:ln w="50800">
+                  <a:solidFill>
+                    <a:srgbClr val="C00000"/>
+                  </a:solidFill>
+                </a:ln>
+                <a:solidFill>
+                  <a:schemeClr val="bg1">
+                    <a:shade val="50000"/>
+                  </a:schemeClr>
+                </a:solidFill>
+                <a:effectLst>
+                  <a:glow rad="228600">
+                    <a:schemeClr val="accent3">
+                      <a:satMod val="175000"/>
+                      <a:alpha val="40000"/>
+                    </a:schemeClr>
+                  </a:glow>
+                </a:effectLst>
+              </a:rPr>
+              <a:t>TYLERED!</a:t>
+            </a:r>
+          </a:p>
+        </p:txBody>
+      </p:sp>
     </p:spTree>
     <p:extLst>
       <p:ext uri="{BB962C8B-B14F-4D97-AF65-F5344CB8AC3E}">
-        <p14:creationId xmlns:p14="http://schemas.microsoft.com/office/powerpoint/2010/main" val="1402978327"/>
+        <p14:creationId xmlns:p14="http://schemas.microsoft.com/office/powerpoint/2010/main" val="3250535075"/>
       </p:ext>
     </p:extLst>
   </p:cSld>
   <p:clrMapOvr>
     <a:masterClrMapping/>
   </p:clrMapOvr>
+  <p:timing>
+    <p:tnLst>
+      <p:par>
+        <p:cTn id="1" dur="indefinite" restart="never" nodeType="tmRoot"/>
+      </p:par>
+    </p:tnLst>
+  </p:timing>
 </p:sld>
 </file>
 
-<file path=ppt/slides/slide6.xml><?xml version="1.0" encoding="utf-8"?>
+<file path=ppt/slides/slide8.xml><?xml version="1.0" encoding="utf-8"?>
 <p:sld xmlns:a="http://schemas.openxmlformats.org/drawingml/2006/main" xmlns:r="http://schemas.openxmlformats.org/officeDocument/2006/relationships" xmlns:p="http://schemas.openxmlformats.org/presentationml/2006/main">
   <p:cSld>
     <p:spTree>
@@ -4780,7 +5951,7 @@
           <a:p>
             <a:r>
               <a:rPr lang="en-CA" dirty="0" smtClean="0"/>
-              <a:t>Binding “This”</a:t>
+              <a:t>Extra Prevent Default Info</a:t>
             </a:r>
             <a:endParaRPr lang="en-CA" dirty="0"/>
           </a:p>
@@ -4798,27 +5969,98 @@
         </p:nvSpPr>
         <p:spPr/>
         <p:txBody>
-          <a:bodyPr/>
-          <a:lstStyle/>
-          <a:p>
-            <a:endParaRPr lang="en-CA" dirty="0"/>
+          <a:bodyPr>
+            <a:normAutofit/>
+          </a:bodyPr>
+          <a:lstStyle/>
+          <a:p>
+            <a:r>
+              <a:rPr lang="en-CA" sz="2000" dirty="0" smtClean="0"/>
+              <a:t>The second most </a:t>
+            </a:r>
+            <a:r>
+              <a:rPr lang="en-CA" sz="2000" dirty="0" smtClean="0"/>
+              <a:t>commonly listed </a:t>
+            </a:r>
+            <a:r>
+              <a:rPr lang="en-CA" sz="2000" dirty="0" smtClean="0"/>
+              <a:t>use case for </a:t>
+            </a:r>
+            <a:r>
+              <a:rPr lang="en-CA" sz="2000" dirty="0" err="1" smtClean="0"/>
+              <a:t>preventDefault</a:t>
+            </a:r>
+            <a:r>
+              <a:rPr lang="en-CA" sz="2000" dirty="0" smtClean="0"/>
+              <a:t>() </a:t>
+            </a:r>
+            <a:r>
+              <a:rPr lang="en-CA" sz="2000" dirty="0" smtClean="0"/>
+              <a:t>is to prevent the default behaviour when clicking on a link (going to the link’s URL)</a:t>
+            </a:r>
+          </a:p>
+          <a:p>
+            <a:r>
+              <a:rPr lang="en-CA" sz="2000" dirty="0" smtClean="0"/>
+              <a:t>In some situations, browsers will wait to see if </a:t>
+            </a:r>
+            <a:r>
+              <a:rPr lang="en-CA" sz="2000" dirty="0" err="1" smtClean="0"/>
+              <a:t>preventDefault</a:t>
+            </a:r>
+            <a:r>
+              <a:rPr lang="en-CA" sz="2000" dirty="0" smtClean="0"/>
+              <a:t>() is going to be called before proceeding with an event. One specific instance where this can cause issues is with the </a:t>
+            </a:r>
+            <a:r>
+              <a:rPr lang="en-CA" sz="2000" dirty="0" err="1" smtClean="0"/>
+              <a:t>touchmove</a:t>
+            </a:r>
+            <a:r>
+              <a:rPr lang="en-CA" sz="2000" dirty="0" smtClean="0"/>
+              <a:t> event that has to do with scrolling via a touch screen (primarily for mobile apps). Browsers can pause momentarily to check for </a:t>
+            </a:r>
+            <a:r>
+              <a:rPr lang="en-CA" sz="2000" dirty="0" err="1" smtClean="0"/>
+              <a:t>preventDefault</a:t>
+            </a:r>
+            <a:r>
+              <a:rPr lang="en-CA" sz="2000" dirty="0" smtClean="0"/>
+              <a:t>() before continuing to scroll. This can cause the scrolling to delay and “jitter”. In order to prevent the browser from waiting to check for </a:t>
+            </a:r>
+            <a:r>
+              <a:rPr lang="en-CA" sz="2000" dirty="0" err="1" smtClean="0"/>
+              <a:t>preventDefault</a:t>
+            </a:r>
+            <a:r>
+              <a:rPr lang="en-CA" sz="2000" dirty="0" smtClean="0"/>
+              <a:t>, you can specify “passive: true” in your event listener. </a:t>
+            </a:r>
+            <a:endParaRPr lang="en-CA" sz="2000" dirty="0"/>
           </a:p>
         </p:txBody>
       </p:sp>
     </p:spTree>
     <p:extLst>
       <p:ext uri="{BB962C8B-B14F-4D97-AF65-F5344CB8AC3E}">
-        <p14:creationId xmlns:p14="http://schemas.microsoft.com/office/powerpoint/2010/main" val="3753090452"/>
+        <p14:creationId xmlns:p14="http://schemas.microsoft.com/office/powerpoint/2010/main" val="3103140282"/>
       </p:ext>
     </p:extLst>
   </p:cSld>
   <p:clrMapOvr>
     <a:masterClrMapping/>
   </p:clrMapOvr>
+  <p:timing>
+    <p:tnLst>
+      <p:par>
+        <p:cTn id="1" dur="indefinite" restart="never" nodeType="tmRoot"/>
+      </p:par>
+    </p:tnLst>
+  </p:timing>
 </p:sld>
 </file>
 
-<file path=ppt/slides/slide7.xml><?xml version="1.0" encoding="utf-8"?>
+<file path=ppt/slides/slide9.xml><?xml version="1.0" encoding="utf-8"?>
 <p:sld xmlns:a="http://schemas.openxmlformats.org/drawingml/2006/main" xmlns:r="http://schemas.openxmlformats.org/officeDocument/2006/relationships" xmlns:p="http://schemas.openxmlformats.org/presentationml/2006/main">
   <p:cSld>
     <p:spTree>
@@ -4847,14 +6089,12 @@
         </p:nvSpPr>
         <p:spPr/>
         <p:txBody>
-          <a:bodyPr>
-            <a:normAutofit fontScale="90000"/>
-          </a:bodyPr>
+          <a:bodyPr/>
           <a:lstStyle/>
           <a:p>
             <a:r>
               <a:rPr lang="en-CA" dirty="0" smtClean="0"/>
-              <a:t>Passing Arguments to Event Handlers</a:t>
+              <a:t>Binding “This”</a:t>
             </a:r>
             <a:endParaRPr lang="en-CA" dirty="0"/>
           </a:p>
@@ -4875,6 +6115,46 @@
           <a:bodyPr/>
           <a:lstStyle/>
           <a:p>
+            <a:r>
+              <a:rPr lang="en-CA" dirty="0" smtClean="0"/>
+              <a:t>In JavaScript, class methods are not bound by default. If ‘this’ is not bound, and you call a method (example: </a:t>
+            </a:r>
+            <a:r>
+              <a:rPr lang="en-CA" dirty="0" err="1" smtClean="0"/>
+              <a:t>this.handleClick</a:t>
+            </a:r>
+            <a:r>
+              <a:rPr lang="en-CA" dirty="0" smtClean="0"/>
+              <a:t>) and then pass it to an </a:t>
+            </a:r>
+            <a:r>
+              <a:rPr lang="en-CA" dirty="0" err="1" smtClean="0"/>
+              <a:t>onClick</a:t>
+            </a:r>
+            <a:r>
+              <a:rPr lang="en-CA" dirty="0" smtClean="0"/>
+              <a:t> event (example: &lt;button </a:t>
+            </a:r>
+            <a:r>
+              <a:rPr lang="en-CA" dirty="0" err="1" smtClean="0"/>
+              <a:t>onClick</a:t>
+            </a:r>
+            <a:r>
+              <a:rPr lang="en-CA" dirty="0" smtClean="0"/>
+              <a:t>={</a:t>
+            </a:r>
+            <a:r>
+              <a:rPr lang="en-CA" dirty="0" err="1" smtClean="0"/>
+              <a:t>this.handleClick</a:t>
+            </a:r>
+            <a:r>
+              <a:rPr lang="en-CA" dirty="0" smtClean="0"/>
+              <a:t>}), ‘this’ will </a:t>
+            </a:r>
+            <a:r>
+              <a:rPr lang="en-CA" smtClean="0"/>
+              <a:t>be undefined. </a:t>
+            </a:r>
             <a:endParaRPr lang="en-CA" dirty="0"/>
           </a:p>
         </p:txBody>
@@ -4882,13 +6162,20 @@
     </p:spTree>
     <p:extLst>
       <p:ext uri="{BB962C8B-B14F-4D97-AF65-F5344CB8AC3E}">
-        <p14:creationId xmlns:p14="http://schemas.microsoft.com/office/powerpoint/2010/main" val="194129807"/>
+        <p14:creationId xmlns:p14="http://schemas.microsoft.com/office/powerpoint/2010/main" val="3753090452"/>
       </p:ext>
     </p:extLst>
   </p:cSld>
   <p:clrMapOvr>
     <a:masterClrMapping/>
   </p:clrMapOvr>
+  <p:timing>
+    <p:tnLst>
+      <p:par>
+        <p:cTn id="1" dur="indefinite" restart="never" nodeType="tmRoot"/>
+      </p:par>
+    </p:tnLst>
+  </p:timing>
 </p:sld>
 </file>
 

</xml_diff>